<commit_message>
updates on the slides and an update to the db seeding script
</commit_message>
<xml_diff>
--- a/Containerization.pptx
+++ b/Containerization.pptx
@@ -139,6 +139,18 @@
     </p:ext>
   </p:extLst>
 </p:presentation>
+</file>
+
+<file path=ppt/commentAuthors.xml><?xml version="1.0" encoding="utf-8"?>
+<p:cmAuthorLst xmlns:a="http://schemas.openxmlformats.org/drawingml/2006/main" xmlns:r="http://schemas.openxmlformats.org/officeDocument/2006/relationships" xmlns:p="http://schemas.openxmlformats.org/presentationml/2006/main">
+  <p:cmAuthor id="1" name="Mike Sellers" initials="MS" lastIdx="1" clrIdx="0">
+    <p:extLst>
+      <p:ext uri="{19B8F6BF-5375-455C-9EA6-DF929625EA0E}">
+        <p15:presenceInfo xmlns:p15="http://schemas.microsoft.com/office/powerpoint/2012/main" userId="S-1-5-21-1214440339-484763869-725345543-4147526" providerId="AD"/>
+      </p:ext>
+    </p:extLst>
+  </p:cmAuthor>
+</p:cmAuthorLst>
 </file>
 
 <file path=ppt/notesMasters/notesMaster1.xml><?xml version="1.0" encoding="utf-8"?>
@@ -3813,7 +3825,15 @@
           <a:p>
             <a:r>
               <a:rPr lang="en-US" sz="2000" dirty="0" smtClean="0"/>
-              <a:t>April 18, 2019</a:t>
+              <a:t>April </a:t>
+            </a:r>
+            <a:r>
+              <a:rPr lang="en-US" sz="2000" dirty="0" smtClean="0"/>
+              <a:t>17, </a:t>
+            </a:r>
+            <a:r>
+              <a:rPr lang="en-US" sz="2000" dirty="0" smtClean="0"/>
+              <a:t>2019</a:t>
             </a:r>
             <a:endParaRPr lang="en-US" sz="2000" dirty="0"/>
           </a:p>
@@ -12813,11 +12833,7 @@
             </a:r>
             <a:r>
               <a:rPr lang="en-US" sz="1900" b="0" dirty="0" smtClean="0"/>
-              <a:t>  The demo project and all Docker projects can run on any syste</a:t>
-            </a:r>
-            <a:r>
-              <a:rPr lang="en-US" sz="1900" b="0" dirty="0" smtClean="0"/>
-              <a:t>m running a Docker engine.</a:t>
+              <a:t>  The demo project and all Docker projects can run on any system running a Docker engine.</a:t>
             </a:r>
           </a:p>
           <a:p>
@@ -12826,13 +12842,8 @@
           <a:p>
             <a:r>
               <a:rPr lang="en-US" dirty="0" smtClean="0"/>
-              <a:t>MEAN Project Development can be </a:t>
-            </a:r>
-            <a:r>
-              <a:rPr lang="en-US" dirty="0" smtClean="0"/>
-              <a:t>performed in various ways:</a:t>
-            </a:r>
-            <a:endParaRPr lang="en-US" dirty="0" smtClean="0"/>
+              <a:t>MEAN Project Development can be performed in various ways:</a:t>
+            </a:r>
           </a:p>
           <a:p>
             <a:pPr marL="342900" indent="-342900">
@@ -12867,11 +12878,7 @@
             </a:r>
             <a:r>
               <a:rPr lang="en-US" b="0" dirty="0" smtClean="0"/>
-              <a:t> run node + volumes</a:t>
-            </a:r>
-            <a:r>
-              <a:rPr lang="en-US" b="0" dirty="0" smtClean="0"/>
-              <a:t>)</a:t>
+              <a:t> run node + volumes)</a:t>
             </a:r>
           </a:p>
           <a:p>
@@ -12883,7 +12890,6 @@
               <a:rPr lang="en-US" b="0" dirty="0" smtClean="0"/>
               <a:t>…</a:t>
             </a:r>
-            <a:endParaRPr lang="en-US" b="0" dirty="0" smtClean="0"/>
           </a:p>
         </p:txBody>
       </p:sp>
@@ -13181,11 +13187,7 @@
             <a:pPr lvl="1"/>
             <a:r>
               <a:rPr lang="en-US" b="0" dirty="0" smtClean="0"/>
-              <a:t>a)	Docker </a:t>
-            </a:r>
-            <a:r>
-              <a:rPr lang="en-US" b="0" dirty="0" smtClean="0"/>
-              <a:t>run, </a:t>
+              <a:t>a)	Docker run, </a:t>
             </a:r>
             <a:r>
               <a:rPr lang="en-US" b="0" dirty="0"/>
@@ -14489,13 +14491,19 @@
               <a:rPr lang="en-US" dirty="0" smtClean="0">
                 <a:latin typeface="OCR A Extended" panose="02010509020102010303" pitchFamily="50" charset="0"/>
               </a:rPr>
-              <a:t>-compose </a:t>
+              <a:t>-compose build </a:t>
             </a:r>
             <a:r>
               <a:rPr lang="en-US" dirty="0" smtClean="0">
                 <a:latin typeface="OCR A Extended" panose="02010509020102010303" pitchFamily="50" charset="0"/>
               </a:rPr>
-              <a:t>build –no-cache</a:t>
+              <a:t>--</a:t>
+            </a:r>
+            <a:r>
+              <a:rPr lang="en-US" dirty="0" smtClean="0">
+                <a:latin typeface="OCR A Extended" panose="02010509020102010303" pitchFamily="50" charset="0"/>
+              </a:rPr>
+              <a:t>no-cache</a:t>
             </a:r>
             <a:endParaRPr lang="en-US" b="0" dirty="0"/>
           </a:p>
@@ -14740,10 +14748,16 @@
           <a:p>
             <a:pPr lvl="1"/>
             <a:r>
+              <a:rPr lang="en-US" dirty="0" smtClean="0">
+                <a:latin typeface="OCR A Extended" panose="02010509020102010303" pitchFamily="50" charset="0"/>
+              </a:rPr>
+              <a:t>	</a:t>
+            </a:r>
+            <a:r>
               <a:rPr lang="en-US" dirty="0">
                 <a:latin typeface="OCR A Extended" panose="02010509020102010303" pitchFamily="50" charset="0"/>
               </a:rPr>
-              <a:t>		</a:t>
+              <a:t>	</a:t>
             </a:r>
             <a:r>
               <a:rPr lang="en-US" dirty="0" err="1">
@@ -14775,32 +14789,39 @@
               </a:rPr>
               <a:t>up</a:t>
             </a:r>
+          </a:p>
+          <a:p>
+            <a:pPr lvl="1"/>
+            <a:r>
+              <a:rPr lang="en-US" b="0" dirty="0" smtClean="0">
+                <a:latin typeface="OCR A Extended" panose="02010509020102010303" pitchFamily="50" charset="0"/>
+              </a:rPr>
+              <a:t>		</a:t>
+            </a:r>
+          </a:p>
+          <a:p>
+            <a:pPr lvl="1"/>
             <a:endParaRPr lang="en-US" b="0" dirty="0">
               <a:latin typeface="OCR A Extended" panose="02010509020102010303" pitchFamily="50" charset="0"/>
             </a:endParaRPr>
           </a:p>
           <a:p>
             <a:pPr lvl="1"/>
-            <a:endParaRPr lang="en-US" b="0" dirty="0"/>
-          </a:p>
-          <a:p>
-            <a:endParaRPr lang="en-US" b="0" dirty="0" smtClean="0"/>
+            <a:endParaRPr lang="en-US" b="0" dirty="0" smtClean="0">
+              <a:latin typeface="OCR A Extended" panose="02010509020102010303" pitchFamily="50" charset="0"/>
+            </a:endParaRPr>
           </a:p>
           <a:p>
             <a:pPr lvl="1"/>
-            <a:endParaRPr lang="en-US" b="0" dirty="0" smtClean="0"/>
+            <a:endParaRPr lang="en-US" b="0" dirty="0">
+              <a:latin typeface="OCR A Extended" panose="02010509020102010303" pitchFamily="50" charset="0"/>
+            </a:endParaRPr>
           </a:p>
           <a:p>
             <a:pPr lvl="1"/>
-            <a:endParaRPr lang="en-US" b="0" dirty="0" smtClean="0"/>
-          </a:p>
-          <a:p>
-            <a:pPr lvl="1"/>
-            <a:endParaRPr lang="en-US" b="0" dirty="0" smtClean="0"/>
-          </a:p>
-          <a:p>
-            <a:pPr lvl="1"/>
-            <a:endParaRPr lang="en-US" b="0" dirty="0"/>
+            <a:endParaRPr lang="en-US" b="0" dirty="0">
+              <a:latin typeface="OCR A Extended" panose="02010509020102010303" pitchFamily="50" charset="0"/>
+            </a:endParaRPr>
           </a:p>
         </p:txBody>
       </p:sp>
@@ -14820,7 +14841,7 @@
         </p:blipFill>
         <p:spPr>
           <a:xfrm>
-            <a:off x="1108147" y="4288935"/>
+            <a:off x="1108147" y="4831860"/>
             <a:ext cx="9978879" cy="726715"/>
           </a:xfrm>
           <a:prstGeom prst="rect">
@@ -15153,12 +15174,6 @@
           </a:p>
           <a:p>
             <a:r>
-              <a:rPr lang="en-US" dirty="0" smtClean="0">
-                <a:latin typeface="OCR A Extended" panose="02010509020102010303" pitchFamily="50" charset="0"/>
-              </a:rPr>
-              <a:t>	</a:t>
-            </a:r>
-            <a:r>
               <a:rPr lang="en-US" dirty="0" err="1" smtClean="0">
                 <a:latin typeface="OCR A Extended" panose="02010509020102010303" pitchFamily="50" charset="0"/>
               </a:rPr>
@@ -15182,11 +15197,26 @@
           </a:p>
           <a:p>
             <a:r>
-              <a:rPr lang="en-US" dirty="0">
+              <a:rPr lang="en-US" dirty="0" err="1" smtClean="0">
                 <a:latin typeface="OCR A Extended" panose="02010509020102010303" pitchFamily="50" charset="0"/>
               </a:rPr>
-              <a:t>	</a:t>
-            </a:r>
+              <a:t>docker</a:t>
+            </a:r>
+            <a:r>
+              <a:rPr lang="en-US" dirty="0" smtClean="0">
+                <a:latin typeface="OCR A Extended" panose="02010509020102010303" pitchFamily="50" charset="0"/>
+              </a:rPr>
+              <a:t> </a:t>
+            </a:r>
+            <a:r>
+              <a:rPr lang="en-US" dirty="0" smtClean="0">
+                <a:latin typeface="OCR A Extended" panose="02010509020102010303" pitchFamily="50" charset="0"/>
+              </a:rPr>
+              <a:t>logs</a:t>
+            </a:r>
+            <a:endParaRPr lang="en-US" b="0" dirty="0"/>
+          </a:p>
+          <a:p>
             <a:r>
               <a:rPr lang="en-US" dirty="0" err="1">
                 <a:latin typeface="OCR A Extended" panose="02010509020102010303" pitchFamily="50" charset="0"/>
@@ -15197,52 +15227,93 @@
               <a:rPr lang="en-US" dirty="0">
                 <a:latin typeface="OCR A Extended" panose="02010509020102010303" pitchFamily="50" charset="0"/>
               </a:rPr>
-              <a:t> </a:t>
+              <a:t> exec</a:t>
+            </a:r>
+            <a:r>
+              <a:rPr lang="en-US" b="0" dirty="0">
+                <a:latin typeface="OCR A Extended" panose="02010509020102010303" pitchFamily="50" charset="0"/>
+              </a:rPr>
+              <a:t> –it 275fc4b89d42 </a:t>
+            </a:r>
+            <a:r>
+              <a:rPr lang="en-US" b="0" dirty="0" smtClean="0">
+                <a:latin typeface="OCR A Extended" panose="02010509020102010303" pitchFamily="50" charset="0"/>
+              </a:rPr>
+              <a:t>bash</a:t>
+            </a:r>
+          </a:p>
+          <a:p>
+            <a:r>
+              <a:rPr lang="en-US" b="0" dirty="0">
+                <a:latin typeface="OCR A Extended" panose="02010509020102010303" pitchFamily="50" charset="0"/>
+              </a:rPr>
+              <a:t>	</a:t>
+            </a:r>
+            <a:r>
+              <a:rPr lang="en-US" b="0" dirty="0" smtClean="0">
+                <a:latin typeface="OCR A Extended" panose="02010509020102010303" pitchFamily="50" charset="0"/>
+              </a:rPr>
+              <a:t>cd </a:t>
+            </a:r>
+            <a:r>
+              <a:rPr lang="en-US" b="0" dirty="0">
+                <a:latin typeface="OCR A Extended" panose="02010509020102010303" pitchFamily="50" charset="0"/>
+              </a:rPr>
+              <a:t>/home &amp;&amp; </a:t>
+            </a:r>
+            <a:r>
+              <a:rPr lang="en-US" b="0" dirty="0" err="1">
+                <a:latin typeface="OCR A Extended" panose="02010509020102010303" pitchFamily="50" charset="0"/>
+              </a:rPr>
+              <a:t>mongoimport</a:t>
+            </a:r>
+            <a:r>
+              <a:rPr lang="en-US" b="0" dirty="0">
+                <a:latin typeface="OCR A Extended" panose="02010509020102010303" pitchFamily="50" charset="0"/>
+              </a:rPr>
+              <a:t> 	--</a:t>
+            </a:r>
+            <a:r>
+              <a:rPr lang="en-US" b="0" dirty="0" err="1" smtClean="0">
+                <a:latin typeface="OCR A Extended" panose="02010509020102010303" pitchFamily="50" charset="0"/>
+              </a:rPr>
+              <a:t>db</a:t>
+            </a:r>
+            <a:r>
+              <a:rPr lang="en-US" b="0" dirty="0" smtClean="0">
+                <a:latin typeface="OCR A Extended" panose="02010509020102010303" pitchFamily="50" charset="0"/>
+              </a:rPr>
+              <a:t> mean-angular6 </a:t>
+            </a:r>
+            <a:r>
+              <a:rPr lang="en-US" b="0" dirty="0">
+                <a:latin typeface="OCR A Extended" panose="02010509020102010303" pitchFamily="50" charset="0"/>
+              </a:rPr>
+              <a:t>--collection </a:t>
+            </a:r>
+            <a:r>
+              <a:rPr lang="en-US" b="0" dirty="0" smtClean="0">
+                <a:latin typeface="OCR A Extended" panose="02010509020102010303" pitchFamily="50" charset="0"/>
+              </a:rPr>
+              <a:t>entries /home/</a:t>
+            </a:r>
+            <a:r>
+              <a:rPr lang="en-US" b="0" dirty="0" err="1" smtClean="0">
+                <a:latin typeface="OCR A Extended" panose="02010509020102010303" pitchFamily="50" charset="0"/>
+              </a:rPr>
+              <a:t>data.json</a:t>
             </a:r>
             <a:r>
               <a:rPr lang="en-US" dirty="0" smtClean="0">
                 <a:latin typeface="OCR A Extended" panose="02010509020102010303" pitchFamily="50" charset="0"/>
               </a:rPr>
-              <a:t>logs</a:t>
-            </a:r>
-            <a:endParaRPr lang="en-US" b="0" dirty="0"/>
-          </a:p>
-          <a:p>
-            <a:r>
-              <a:rPr lang="en-US" dirty="0">
-                <a:latin typeface="OCR A Extended" panose="02010509020102010303" pitchFamily="50" charset="0"/>
-              </a:rPr>
-              <a:t>	</a:t>
-            </a:r>
-            <a:r>
-              <a:rPr lang="en-US" dirty="0" err="1">
-                <a:latin typeface="OCR A Extended" panose="02010509020102010303" pitchFamily="50" charset="0"/>
-              </a:rPr>
-              <a:t>docker</a:t>
-            </a:r>
-            <a:r>
-              <a:rPr lang="en-US" dirty="0">
-                <a:latin typeface="OCR A Extended" panose="02010509020102010303" pitchFamily="50" charset="0"/>
-              </a:rPr>
               <a:t> </a:t>
             </a:r>
-            <a:r>
-              <a:rPr lang="en-US" dirty="0" smtClean="0">
-                <a:latin typeface="OCR A Extended" panose="02010509020102010303" pitchFamily="50" charset="0"/>
-              </a:rPr>
-              <a:t>exec –it </a:t>
-            </a:r>
-            <a:endParaRPr lang="en-US" b="0" dirty="0"/>
-          </a:p>
-          <a:p>
             <a:endParaRPr lang="en-US" b="0" dirty="0"/>
           </a:p>
           <a:p>
             <a:pPr lvl="1"/>
             <a:endParaRPr lang="en-US" b="0" dirty="0"/>
-          </a:p>
-          <a:p>
-            <a:endParaRPr lang="en-US" b="0" dirty="0" smtClean="0"/>
           </a:p>
           <a:p>
             <a:pPr lvl="1"/>
@@ -15278,8 +15349,8 @@
         </p:blipFill>
         <p:spPr>
           <a:xfrm>
-            <a:off x="716920" y="3335382"/>
-            <a:ext cx="10436660" cy="2845858"/>
+            <a:off x="1659895" y="3960531"/>
+            <a:ext cx="9093830" cy="2479696"/>
           </a:xfrm>
           <a:prstGeom prst="rect">
             <a:avLst/>
@@ -15382,11 +15453,7 @@
           <a:p>
             <a:r>
               <a:rPr lang="en-US" b="0" dirty="0" smtClean="0"/>
-              <a:t>Test the application using a local </a:t>
-            </a:r>
-            <a:r>
-              <a:rPr lang="en-US" b="0" dirty="0" smtClean="0"/>
-              <a:t>browser by browsing:</a:t>
+              <a:t>Test the application using a local browser by browsing:</a:t>
             </a:r>
           </a:p>
           <a:p>
@@ -16014,7 +16081,13 @@
               <a:rPr lang="en-US" sz="2000" dirty="0" smtClean="0">
                 <a:latin typeface="OCR A Extended" panose="02010509020102010303" pitchFamily="50" charset="0"/>
               </a:rPr>
-              <a:t>stack deploy –c </a:t>
+              <a:t>stack deploy </a:t>
+            </a:r>
+            <a:r>
+              <a:rPr lang="en-US" sz="2000" dirty="0" smtClean="0">
+                <a:latin typeface="OCR A Extended" panose="02010509020102010303" pitchFamily="50" charset="0"/>
+              </a:rPr>
+              <a:t>-c </a:t>
             </a:r>
             <a:r>
               <a:rPr lang="en-US" sz="2000" dirty="0" err="1" smtClean="0">
@@ -16196,6 +16269,12 @@
           </a:p>
           <a:p>
             <a:r>
+              <a:rPr lang="en-US" sz="2000" dirty="0" smtClean="0">
+                <a:latin typeface="OCR A Extended" panose="02010509020102010303" pitchFamily="50" charset="0"/>
+              </a:rPr>
+              <a:t>	</a:t>
+            </a:r>
+            <a:r>
               <a:rPr lang="en-US" sz="2000" dirty="0" err="1" smtClean="0">
                 <a:latin typeface="OCR A Extended" panose="02010509020102010303" pitchFamily="50" charset="0"/>
               </a:rPr>
@@ -16205,7 +16284,13 @@
               <a:rPr lang="en-US" sz="2000" dirty="0" smtClean="0">
                 <a:latin typeface="OCR A Extended" panose="02010509020102010303" pitchFamily="50" charset="0"/>
               </a:rPr>
-              <a:t> service scale </a:t>
+              <a:t> </a:t>
+            </a:r>
+            <a:r>
+              <a:rPr lang="en-US" sz="2000" dirty="0" smtClean="0">
+                <a:latin typeface="OCR A Extended" panose="02010509020102010303" pitchFamily="50" charset="0"/>
+              </a:rPr>
+              <a:t>service scale </a:t>
             </a:r>
             <a:r>
               <a:rPr lang="en-US" sz="2000" dirty="0" err="1" smtClean="0">
@@ -16219,6 +16304,9 @@
               </a:rPr>
               <a:t>=5</a:t>
             </a:r>
+            <a:endParaRPr lang="en-US" sz="2000" dirty="0" smtClean="0">
+              <a:latin typeface="OCR A Extended" panose="02010509020102010303" pitchFamily="50" charset="0"/>
+            </a:endParaRPr>
           </a:p>
         </p:txBody>
       </p:sp>

</xml_diff>

<commit_message>
Command formatting preparation and slide updates
</commit_message>
<xml_diff>
--- a/Containerization.pptx
+++ b/Containerization.pptx
@@ -5,7 +5,7 @@
     <p:sldMasterId id="2147483648" r:id="rId1"/>
   </p:sldMasterIdLst>
   <p:notesMasterIdLst>
-    <p:notesMasterId r:id="rId29"/>
+    <p:notesMasterId r:id="rId30"/>
   </p:notesMasterIdLst>
   <p:sldIdLst>
     <p:sldId id="256" r:id="rId2"/>
@@ -33,8 +33,9 @@
     <p:sldId id="268" r:id="rId24"/>
     <p:sldId id="269" r:id="rId25"/>
     <p:sldId id="279" r:id="rId26"/>
-    <p:sldId id="276" r:id="rId27"/>
-    <p:sldId id="275" r:id="rId28"/>
+    <p:sldId id="289" r:id="rId27"/>
+    <p:sldId id="276" r:id="rId28"/>
+    <p:sldId id="275" r:id="rId29"/>
   </p:sldIdLst>
   <p:sldSz cx="12192000" cy="6858000"/>
   <p:notesSz cx="6858000" cy="9144000"/>
@@ -235,7 +236,7 @@
           <a:p>
             <a:fld id="{959F3FEB-A1CE-46E9-86AF-09CE95358452}" type="datetimeFigureOut">
               <a:rPr lang="en-US" smtClean="0"/>
-              <a:t>4/16/2019</a:t>
+              <a:t>4/17/2019</a:t>
             </a:fld>
             <a:endParaRPr lang="en-US"/>
           </a:p>
@@ -828,7 +829,7 @@
           <a:p>
             <a:fld id="{97E854D6-41DC-4048-AED9-4FC260D2CC63}" type="datetimeFigureOut">
               <a:rPr lang="en-US" smtClean="0"/>
-              <a:t>4/16/2019</a:t>
+              <a:t>4/17/2019</a:t>
             </a:fld>
             <a:endParaRPr lang="en-US"/>
           </a:p>
@@ -996,7 +997,7 @@
           <a:p>
             <a:fld id="{97E854D6-41DC-4048-AED9-4FC260D2CC63}" type="datetimeFigureOut">
               <a:rPr lang="en-US" smtClean="0"/>
-              <a:t>4/16/2019</a:t>
+              <a:t>4/17/2019</a:t>
             </a:fld>
             <a:endParaRPr lang="en-US"/>
           </a:p>
@@ -1174,7 +1175,7 @@
           <a:p>
             <a:fld id="{97E854D6-41DC-4048-AED9-4FC260D2CC63}" type="datetimeFigureOut">
               <a:rPr lang="en-US" smtClean="0"/>
-              <a:t>4/16/2019</a:t>
+              <a:t>4/17/2019</a:t>
             </a:fld>
             <a:endParaRPr lang="en-US"/>
           </a:p>
@@ -1509,7 +1510,7 @@
           <a:p>
             <a:fld id="{97E854D6-41DC-4048-AED9-4FC260D2CC63}" type="datetimeFigureOut">
               <a:rPr lang="en-US" smtClean="0"/>
-              <a:t>4/16/2019</a:t>
+              <a:t>4/17/2019</a:t>
             </a:fld>
             <a:endParaRPr lang="en-US"/>
           </a:p>
@@ -1754,7 +1755,7 @@
           <a:p>
             <a:fld id="{97E854D6-41DC-4048-AED9-4FC260D2CC63}" type="datetimeFigureOut">
               <a:rPr lang="en-US" smtClean="0"/>
-              <a:t>4/16/2019</a:t>
+              <a:t>4/17/2019</a:t>
             </a:fld>
             <a:endParaRPr lang="en-US"/>
           </a:p>
@@ -1983,7 +1984,7 @@
           <a:p>
             <a:fld id="{97E854D6-41DC-4048-AED9-4FC260D2CC63}" type="datetimeFigureOut">
               <a:rPr lang="en-US" smtClean="0"/>
-              <a:t>4/16/2019</a:t>
+              <a:t>4/17/2019</a:t>
             </a:fld>
             <a:endParaRPr lang="en-US"/>
           </a:p>
@@ -2347,7 +2348,7 @@
           <a:p>
             <a:fld id="{97E854D6-41DC-4048-AED9-4FC260D2CC63}" type="datetimeFigureOut">
               <a:rPr lang="en-US" smtClean="0"/>
-              <a:t>4/16/2019</a:t>
+              <a:t>4/17/2019</a:t>
             </a:fld>
             <a:endParaRPr lang="en-US"/>
           </a:p>
@@ -2464,7 +2465,7 @@
           <a:p>
             <a:fld id="{97E854D6-41DC-4048-AED9-4FC260D2CC63}" type="datetimeFigureOut">
               <a:rPr lang="en-US" smtClean="0"/>
-              <a:t>4/16/2019</a:t>
+              <a:t>4/17/2019</a:t>
             </a:fld>
             <a:endParaRPr lang="en-US"/>
           </a:p>
@@ -2559,7 +2560,7 @@
           <a:p>
             <a:fld id="{97E854D6-41DC-4048-AED9-4FC260D2CC63}" type="datetimeFigureOut">
               <a:rPr lang="en-US" smtClean="0"/>
-              <a:t>4/16/2019</a:t>
+              <a:t>4/17/2019</a:t>
             </a:fld>
             <a:endParaRPr lang="en-US"/>
           </a:p>
@@ -2834,7 +2835,7 @@
           <a:p>
             <a:fld id="{97E854D6-41DC-4048-AED9-4FC260D2CC63}" type="datetimeFigureOut">
               <a:rPr lang="en-US" smtClean="0"/>
-              <a:t>4/16/2019</a:t>
+              <a:t>4/17/2019</a:t>
             </a:fld>
             <a:endParaRPr lang="en-US"/>
           </a:p>
@@ -3086,7 +3087,7 @@
           <a:p>
             <a:fld id="{97E854D6-41DC-4048-AED9-4FC260D2CC63}" type="datetimeFigureOut">
               <a:rPr lang="en-US" smtClean="0"/>
-              <a:t>4/16/2019</a:t>
+              <a:t>4/17/2019</a:t>
             </a:fld>
             <a:endParaRPr lang="en-US"/>
           </a:p>
@@ -3297,7 +3298,7 @@
           <a:p>
             <a:fld id="{97E854D6-41DC-4048-AED9-4FC260D2CC63}" type="datetimeFigureOut">
               <a:rPr lang="en-US" smtClean="0"/>
-              <a:t>4/16/2019</a:t>
+              <a:t>4/17/2019</a:t>
             </a:fld>
             <a:endParaRPr lang="en-US"/>
           </a:p>
@@ -3825,15 +3826,7 @@
           <a:p>
             <a:r>
               <a:rPr lang="en-US" sz="2000" dirty="0" smtClean="0"/>
-              <a:t>April </a:t>
-            </a:r>
-            <a:r>
-              <a:rPr lang="en-US" sz="2000" dirty="0" smtClean="0"/>
-              <a:t>17, </a:t>
-            </a:r>
-            <a:r>
-              <a:rPr lang="en-US" sz="2000" dirty="0" smtClean="0"/>
-              <a:t>2019</a:t>
+              <a:t>April 17, 2019</a:t>
             </a:r>
             <a:endParaRPr lang="en-US" sz="2000" dirty="0"/>
           </a:p>
@@ -14491,19 +14484,7 @@
               <a:rPr lang="en-US" dirty="0" smtClean="0">
                 <a:latin typeface="OCR A Extended" panose="02010509020102010303" pitchFamily="50" charset="0"/>
               </a:rPr>
-              <a:t>-compose build </a:t>
-            </a:r>
-            <a:r>
-              <a:rPr lang="en-US" dirty="0" smtClean="0">
-                <a:latin typeface="OCR A Extended" panose="02010509020102010303" pitchFamily="50" charset="0"/>
-              </a:rPr>
-              <a:t>--</a:t>
-            </a:r>
-            <a:r>
-              <a:rPr lang="en-US" dirty="0" smtClean="0">
-                <a:latin typeface="OCR A Extended" panose="02010509020102010303" pitchFamily="50" charset="0"/>
-              </a:rPr>
-              <a:t>no-cache</a:t>
+              <a:t>-compose build --no-cache</a:t>
             </a:r>
             <a:endParaRPr lang="en-US" b="0" dirty="0"/>
           </a:p>
@@ -15206,13 +15187,7 @@
               <a:rPr lang="en-US" dirty="0" smtClean="0">
                 <a:latin typeface="OCR A Extended" panose="02010509020102010303" pitchFamily="50" charset="0"/>
               </a:rPr>
-              <a:t> </a:t>
-            </a:r>
-            <a:r>
-              <a:rPr lang="en-US" dirty="0" smtClean="0">
-                <a:latin typeface="OCR A Extended" panose="02010509020102010303" pitchFamily="50" charset="0"/>
-              </a:rPr>
-              <a:t>logs</a:t>
+              <a:t> logs</a:t>
             </a:r>
             <a:endParaRPr lang="en-US" b="0" dirty="0"/>
           </a:p>
@@ -15786,7 +15761,15 @@
           <a:p>
             <a:r>
               <a:rPr lang="en-US" sz="2000" b="0" dirty="0"/>
-              <a:t>1 – Issue the following command to create an internal Class C overlay network for internal communications / physical network abstraction.</a:t>
+              <a:t>1 – Issue the following command to create an internal Class </a:t>
+            </a:r>
+            <a:r>
+              <a:rPr lang="en-US" sz="2000" b="0" dirty="0" smtClean="0"/>
+              <a:t>D </a:t>
+            </a:r>
+            <a:r>
+              <a:rPr lang="en-US" sz="2000" b="0" dirty="0"/>
+              <a:t>overlay network for internal communications / physical network abstraction.</a:t>
             </a:r>
           </a:p>
           <a:p>
@@ -16081,13 +16064,7 @@
               <a:rPr lang="en-US" sz="2000" dirty="0" smtClean="0">
                 <a:latin typeface="OCR A Extended" panose="02010509020102010303" pitchFamily="50" charset="0"/>
               </a:rPr>
-              <a:t>stack deploy </a:t>
-            </a:r>
-            <a:r>
-              <a:rPr lang="en-US" sz="2000" dirty="0" smtClean="0">
-                <a:latin typeface="OCR A Extended" panose="02010509020102010303" pitchFamily="50" charset="0"/>
-              </a:rPr>
-              <a:t>-c </a:t>
+              <a:t>stack deploy -c </a:t>
             </a:r>
             <a:r>
               <a:rPr lang="en-US" sz="2000" dirty="0" err="1" smtClean="0">
@@ -16284,13 +16261,7 @@
               <a:rPr lang="en-US" sz="2000" dirty="0" smtClean="0">
                 <a:latin typeface="OCR A Extended" panose="02010509020102010303" pitchFamily="50" charset="0"/>
               </a:rPr>
-              <a:t> </a:t>
-            </a:r>
-            <a:r>
-              <a:rPr lang="en-US" sz="2000" dirty="0" smtClean="0">
-                <a:latin typeface="OCR A Extended" panose="02010509020102010303" pitchFamily="50" charset="0"/>
-              </a:rPr>
-              <a:t>service scale </a:t>
+              <a:t> service scale </a:t>
             </a:r>
             <a:r>
               <a:rPr lang="en-US" sz="2000" dirty="0" err="1" smtClean="0">
@@ -16304,9 +16275,6 @@
               </a:rPr>
               <a:t>=5</a:t>
             </a:r>
-            <a:endParaRPr lang="en-US" sz="2000" dirty="0" smtClean="0">
-              <a:latin typeface="OCR A Extended" panose="02010509020102010303" pitchFamily="50" charset="0"/>
-            </a:endParaRPr>
           </a:p>
         </p:txBody>
       </p:sp>
@@ -16396,6 +16364,246 @@
           <a:p>
             <a:r>
               <a:rPr lang="en-US" dirty="0"/>
+              <a:t>Docker </a:t>
+            </a:r>
+            <a:r>
+              <a:rPr lang="en-US" dirty="0" smtClean="0"/>
+              <a:t>Demonstration (optional)</a:t>
+            </a:r>
+            <a:endParaRPr lang="en-US" dirty="0"/>
+          </a:p>
+        </p:txBody>
+      </p:sp>
+      <p:sp>
+        <p:nvSpPr>
+          <p:cNvPr id="5" name="Text Placeholder 4"/>
+          <p:cNvSpPr>
+            <a:spLocks noGrp="1"/>
+          </p:cNvSpPr>
+          <p:nvPr>
+            <p:ph type="body" idx="1"/>
+          </p:nvPr>
+        </p:nvSpPr>
+        <p:spPr>
+          <a:xfrm>
+            <a:off x="839788" y="1076326"/>
+            <a:ext cx="10955337" cy="2415019"/>
+          </a:xfrm>
+        </p:spPr>
+        <p:txBody>
+          <a:bodyPr>
+            <a:normAutofit/>
+          </a:bodyPr>
+          <a:lstStyle/>
+          <a:p>
+            <a:r>
+              <a:rPr lang="en-US" dirty="0" smtClean="0"/>
+              <a:t>SHIP - Docker (Trusted) Registry:</a:t>
+            </a:r>
+            <a:endParaRPr lang="en-US" dirty="0"/>
+          </a:p>
+          <a:p>
+            <a:r>
+              <a:rPr lang="en-US" sz="2000" b="0" dirty="0"/>
+              <a:t>1 </a:t>
+            </a:r>
+            <a:r>
+              <a:rPr lang="en-US" sz="2000" b="0" dirty="0" smtClean="0"/>
+              <a:t>– </a:t>
+            </a:r>
+            <a:r>
+              <a:rPr lang="en-US" sz="2000" b="0" dirty="0" smtClean="0"/>
+              <a:t>Push and Pull Containers</a:t>
+            </a:r>
+            <a:endParaRPr lang="en-US" sz="2000" b="0" dirty="0" smtClean="0"/>
+          </a:p>
+          <a:p>
+            <a:r>
+              <a:rPr lang="en-US" sz="2000" b="0" dirty="0" smtClean="0">
+                <a:latin typeface="OCR A Extended" panose="02010509020102010303" pitchFamily="50" charset="0"/>
+              </a:rPr>
+              <a:t>	</a:t>
+            </a:r>
+            <a:r>
+              <a:rPr lang="en-US" sz="2000" b="0" dirty="0" err="1" smtClean="0">
+                <a:latin typeface="OCR A Extended" panose="02010509020102010303" pitchFamily="50" charset="0"/>
+              </a:rPr>
+              <a:t>docker</a:t>
+            </a:r>
+            <a:r>
+              <a:rPr lang="en-US" sz="2000" b="0" dirty="0" smtClean="0">
+                <a:latin typeface="OCR A Extended" panose="02010509020102010303" pitchFamily="50" charset="0"/>
+              </a:rPr>
+              <a:t> </a:t>
+            </a:r>
+            <a:r>
+              <a:rPr lang="en-US" sz="2000" b="0" dirty="0" smtClean="0">
+                <a:latin typeface="OCR A Extended" panose="02010509020102010303" pitchFamily="50" charset="0"/>
+              </a:rPr>
+              <a:t>push </a:t>
+            </a:r>
+            <a:r>
+              <a:rPr lang="en-US" sz="2000" b="0" dirty="0" err="1" smtClean="0">
+                <a:latin typeface="OCR A Extended" panose="02010509020102010303" pitchFamily="50" charset="0"/>
+              </a:rPr>
+              <a:t>jhuopensource</a:t>
+            </a:r>
+            <a:r>
+              <a:rPr lang="en-US" sz="2000" b="0" dirty="0" smtClean="0">
+                <a:latin typeface="OCR A Extended" panose="02010509020102010303" pitchFamily="50" charset="0"/>
+              </a:rPr>
+              <a:t>/</a:t>
+            </a:r>
+            <a:r>
+              <a:rPr lang="en-US" sz="2000" b="0" dirty="0" err="1" smtClean="0">
+                <a:latin typeface="OCR A Extended" panose="02010509020102010303" pitchFamily="50" charset="0"/>
+              </a:rPr>
+              <a:t>meandemo:express_node</a:t>
+            </a:r>
+            <a:endParaRPr lang="en-US" sz="2000" b="0" dirty="0" smtClean="0">
+              <a:latin typeface="OCR A Extended" panose="02010509020102010303" pitchFamily="50" charset="0"/>
+            </a:endParaRPr>
+          </a:p>
+          <a:p>
+            <a:r>
+              <a:rPr lang="en-US" sz="2000" b="0" dirty="0">
+                <a:latin typeface="OCR A Extended" panose="02010509020102010303" pitchFamily="50" charset="0"/>
+              </a:rPr>
+              <a:t>	</a:t>
+            </a:r>
+            <a:r>
+              <a:rPr lang="en-US" sz="2000" b="0" dirty="0" err="1">
+                <a:latin typeface="OCR A Extended" panose="02010509020102010303" pitchFamily="50" charset="0"/>
+              </a:rPr>
+              <a:t>docker</a:t>
+            </a:r>
+            <a:r>
+              <a:rPr lang="en-US" sz="2000" b="0" dirty="0">
+                <a:latin typeface="OCR A Extended" panose="02010509020102010303" pitchFamily="50" charset="0"/>
+              </a:rPr>
+              <a:t> </a:t>
+            </a:r>
+            <a:r>
+              <a:rPr lang="en-US" sz="2000" b="0" dirty="0" smtClean="0">
+                <a:latin typeface="OCR A Extended" panose="02010509020102010303" pitchFamily="50" charset="0"/>
+              </a:rPr>
+              <a:t>pull </a:t>
+            </a:r>
+            <a:r>
+              <a:rPr lang="en-US" sz="2000" b="0" dirty="0" err="1">
+                <a:latin typeface="OCR A Extended" panose="02010509020102010303" pitchFamily="50" charset="0"/>
+              </a:rPr>
+              <a:t>jhuopensource</a:t>
+            </a:r>
+            <a:r>
+              <a:rPr lang="en-US" sz="2000" b="0" dirty="0">
+                <a:latin typeface="OCR A Extended" panose="02010509020102010303" pitchFamily="50" charset="0"/>
+              </a:rPr>
+              <a:t>/</a:t>
+            </a:r>
+            <a:r>
+              <a:rPr lang="en-US" sz="2000" b="0" dirty="0" err="1">
+                <a:latin typeface="OCR A Extended" panose="02010509020102010303" pitchFamily="50" charset="0"/>
+              </a:rPr>
+              <a:t>meandemo:express_node</a:t>
+            </a:r>
+            <a:endParaRPr lang="en-US" sz="2000" b="0" dirty="0">
+              <a:latin typeface="OCR A Extended" panose="02010509020102010303" pitchFamily="50" charset="0"/>
+            </a:endParaRPr>
+          </a:p>
+          <a:p>
+            <a:endParaRPr lang="en-US" sz="2000" b="0" dirty="0">
+              <a:latin typeface="OCR A Extended" panose="02010509020102010303" pitchFamily="50" charset="0"/>
+            </a:endParaRPr>
+          </a:p>
+        </p:txBody>
+      </p:sp>
+      <p:pic>
+        <p:nvPicPr>
+          <p:cNvPr id="3" name="Picture 2"/>
+          <p:cNvPicPr>
+            <a:picLocks noChangeAspect="1"/>
+          </p:cNvPicPr>
+          <p:nvPr/>
+        </p:nvPicPr>
+        <p:blipFill>
+          <a:blip r:embed="rId2"/>
+          <a:stretch>
+            <a:fillRect/>
+          </a:stretch>
+        </p:blipFill>
+        <p:spPr>
+          <a:xfrm>
+            <a:off x="847436" y="3718022"/>
+            <a:ext cx="10507952" cy="1648306"/>
+          </a:xfrm>
+          <a:prstGeom prst="rect">
+            <a:avLst/>
+          </a:prstGeom>
+        </p:spPr>
+      </p:pic>
+    </p:spTree>
+    <p:extLst>
+      <p:ext uri="{BB962C8B-B14F-4D97-AF65-F5344CB8AC3E}">
+        <p14:creationId xmlns:p14="http://schemas.microsoft.com/office/powerpoint/2010/main" val="284691341"/>
+      </p:ext>
+    </p:extLst>
+  </p:cSld>
+  <p:clrMapOvr>
+    <a:masterClrMapping/>
+  </p:clrMapOvr>
+  <p:transition spd="slow">
+    <p:push dir="u"/>
+  </p:transition>
+  <p:timing>
+    <p:tnLst>
+      <p:par>
+        <p:cTn id="1" dur="indefinite" restart="never" nodeType="tmRoot"/>
+      </p:par>
+    </p:tnLst>
+  </p:timing>
+</p:sld>
+</file>
+
+<file path=ppt/slides/slide27.xml><?xml version="1.0" encoding="utf-8"?>
+<p:sld xmlns:a="http://schemas.openxmlformats.org/drawingml/2006/main" xmlns:r="http://schemas.openxmlformats.org/officeDocument/2006/relationships" xmlns:p="http://schemas.openxmlformats.org/presentationml/2006/main">
+  <p:cSld>
+    <p:spTree>
+      <p:nvGrpSpPr>
+        <p:cNvPr id="1" name=""/>
+        <p:cNvGrpSpPr/>
+        <p:nvPr/>
+      </p:nvGrpSpPr>
+      <p:grpSpPr>
+        <a:xfrm>
+          <a:off x="0" y="0"/>
+          <a:ext cx="0" cy="0"/>
+          <a:chOff x="0" y="0"/>
+          <a:chExt cx="0" cy="0"/>
+        </a:xfrm>
+      </p:grpSpPr>
+      <p:sp>
+        <p:nvSpPr>
+          <p:cNvPr id="2" name="Title 1"/>
+          <p:cNvSpPr>
+            <a:spLocks noGrp="1"/>
+          </p:cNvSpPr>
+          <p:nvPr>
+            <p:ph type="title"/>
+          </p:nvPr>
+        </p:nvSpPr>
+        <p:spPr>
+          <a:xfrm>
+            <a:off x="839788" y="102501"/>
+            <a:ext cx="10515600" cy="1325563"/>
+          </a:xfrm>
+        </p:spPr>
+        <p:txBody>
+          <a:bodyPr/>
+          <a:lstStyle/>
+          <a:p>
+            <a:r>
+              <a:rPr lang="en-US" dirty="0"/>
               <a:t>Useful URLs</a:t>
             </a:r>
           </a:p>
@@ -16658,7 +16866,7 @@
 </p:sld>
 </file>
 
-<file path=ppt/slides/slide27.xml><?xml version="1.0" encoding="utf-8"?>
+<file path=ppt/slides/slide28.xml><?xml version="1.0" encoding="utf-8"?>
 <p:sld xmlns:a="http://schemas.openxmlformats.org/drawingml/2006/main" xmlns:r="http://schemas.openxmlformats.org/officeDocument/2006/relationships" xmlns:p="http://schemas.openxmlformats.org/presentationml/2006/main">
   <p:cSld>
     <p:bg>
@@ -17063,94 +17271,30 @@
           <a:chExt cx="0" cy="0"/>
         </a:xfrm>
       </p:grpSpPr>
-      <p:sp>
-        <p:nvSpPr>
-          <p:cNvPr id="2" name="Title 1"/>
-          <p:cNvSpPr>
-            <a:spLocks noGrp="1"/>
-          </p:cNvSpPr>
-          <p:nvPr>
-            <p:ph type="title"/>
-          </p:nvPr>
-        </p:nvSpPr>
-        <p:spPr/>
-        <p:txBody>
-          <a:bodyPr/>
-          <a:lstStyle/>
-          <a:p>
-            <a:r>
-              <a:rPr lang="en-US" dirty="0"/>
-              <a:t>Why Containers?</a:t>
-            </a:r>
-          </a:p>
-        </p:txBody>
-      </p:sp>
-      <p:sp>
-        <p:nvSpPr>
-          <p:cNvPr id="3" name="Content Placeholder 2"/>
-          <p:cNvSpPr>
-            <a:spLocks noGrp="1"/>
-          </p:cNvSpPr>
-          <p:nvPr>
-            <p:ph idx="1"/>
-          </p:nvPr>
-        </p:nvSpPr>
-        <p:spPr/>
-        <p:txBody>
-          <a:bodyPr>
-            <a:normAutofit lnSpcReduction="10000"/>
-          </a:bodyPr>
-          <a:lstStyle/>
-          <a:p>
-            <a:r>
-              <a:rPr lang="en-US" sz="3300" dirty="0"/>
-              <a:t>Hardware agnostic</a:t>
-            </a:r>
-          </a:p>
-          <a:p>
-            <a:r>
-              <a:rPr lang="en-US" sz="3300" dirty="0"/>
-              <a:t>Platform agnostic</a:t>
-            </a:r>
-          </a:p>
-          <a:p>
-            <a:r>
-              <a:rPr lang="en-US" sz="3300" dirty="0"/>
-              <a:t>Environmental abstraction</a:t>
-            </a:r>
-          </a:p>
-          <a:p>
-            <a:r>
-              <a:rPr lang="en-US" sz="3300" dirty="0"/>
-              <a:t>Time to delivery</a:t>
-            </a:r>
-          </a:p>
-          <a:p>
-            <a:r>
-              <a:rPr lang="en-US" sz="3300" dirty="0"/>
-              <a:t>Version control</a:t>
-            </a:r>
-          </a:p>
-          <a:p>
-            <a:r>
-              <a:rPr lang="en-US" sz="3300" dirty="0"/>
-              <a:t>Portability</a:t>
-            </a:r>
-          </a:p>
-          <a:p>
-            <a:r>
-              <a:rPr lang="en-US" sz="3300" dirty="0"/>
-              <a:t>Cloud</a:t>
-            </a:r>
-          </a:p>
-          <a:p>
-            <a:r>
-              <a:rPr lang="en-US" sz="3300" dirty="0"/>
-              <a:t>Security</a:t>
-            </a:r>
-          </a:p>
-        </p:txBody>
-      </p:sp>
+      <p:pic>
+        <p:nvPicPr>
+          <p:cNvPr id="7" name="Picture 6"/>
+          <p:cNvPicPr>
+            <a:picLocks noChangeAspect="1"/>
+          </p:cNvPicPr>
+          <p:nvPr/>
+        </p:nvPicPr>
+        <p:blipFill>
+          <a:blip r:embed="rId2"/>
+          <a:stretch>
+            <a:fillRect/>
+          </a:stretch>
+        </p:blipFill>
+        <p:spPr>
+          <a:xfrm>
+            <a:off x="125133" y="508000"/>
+            <a:ext cx="11875656" cy="5809673"/>
+          </a:xfrm>
+          <a:prstGeom prst="rect">
+            <a:avLst/>
+          </a:prstGeom>
+        </p:spPr>
+      </p:pic>
     </p:spTree>
     <p:extLst>
       <p:ext uri="{BB962C8B-B14F-4D97-AF65-F5344CB8AC3E}">

</xml_diff>